<commit_message>
Add public landing page and separate dashboard route
- Created public-facing landing page at / with:
  - Hero section with animated demo preview
  - Features section highlighting AI capabilities
  - How it works 3-step flow
  - Pricing plans (Starter/Professional/Enterprise)
  - Customer testimonials
  - Full footer with navigation
- Moved authenticated dashboard to /dashboard
- Updated login redirect to go to /dashboard
- Updated Sidebar links to use /dashboard

Co-authored-by: Cursor <cursoragent@cursor.com>
</commit_message>
<xml_diff>
--- a/pitch_deck/Homecare-AI-Pitch-Deck.pptx
+++ b/pitch_deck/Homecare-AI-Pitch-Deck.pptx
@@ -5,21 +5,21 @@
     <p:sldMasterId id="2147483648" r:id="rId1"/>
   </p:sldMasterIdLst>
   <p:sldIdLst>
-    <p:sldId id="256" r:id="rId7"/>
-    <p:sldId id="257" r:id="rId8"/>
-    <p:sldId id="258" r:id="rId9"/>
-    <p:sldId id="259" r:id="rId10"/>
-    <p:sldId id="260" r:id="rId11"/>
-    <p:sldId id="261" r:id="rId12"/>
-    <p:sldId id="262" r:id="rId13"/>
-    <p:sldId id="263" r:id="rId14"/>
-    <p:sldId id="264" r:id="rId15"/>
-    <p:sldId id="265" r:id="rId16"/>
-    <p:sldId id="266" r:id="rId17"/>
-    <p:sldId id="267" r:id="rId18"/>
-    <p:sldId id="268" r:id="rId19"/>
+    <p:sldId id="256" r:id="rId2"/>
+    <p:sldId id="257" r:id="rId3"/>
+    <p:sldId id="258" r:id="rId4"/>
+    <p:sldId id="259" r:id="rId5"/>
+    <p:sldId id="260" r:id="rId6"/>
+    <p:sldId id="261" r:id="rId7"/>
+    <p:sldId id="262" r:id="rId8"/>
+    <p:sldId id="263" r:id="rId9"/>
+    <p:sldId id="264" r:id="rId10"/>
+    <p:sldId id="265" r:id="rId11"/>
+    <p:sldId id="266" r:id="rId12"/>
+    <p:sldId id="267" r:id="rId13"/>
+    <p:sldId id="268" r:id="rId14"/>
   </p:sldIdLst>
-  <p:sldSz cx="12191695" cy="6858000" type="screen4x3"/>
+  <p:sldSz cx="12192000" cy="6858000"/>
   <p:notesSz cx="6858000" cy="9144000"/>
   <p:defaultTextStyle>
     <a:defPPr>
@@ -116,6 +116,22 @@
       </a:defRPr>
     </a:lvl9pPr>
   </p:defaultTextStyle>
+  <p:extLst>
+    <p:ext uri="{EFAFB233-063F-42B5-8137-9DF3F51BA10A}">
+      <p15:sldGuideLst xmlns:p15="http://schemas.microsoft.com/office/powerpoint/2012/main">
+        <p15:guide id="1" orient="horz" pos="2160">
+          <p15:clr>
+            <a:srgbClr val="A4A3A4"/>
+          </p15:clr>
+        </p15:guide>
+        <p15:guide id="2" pos="2880">
+          <p15:clr>
+            <a:srgbClr val="A4A3A4"/>
+          </p15:clr>
+        </p15:guide>
+      </p15:sldGuideLst>
+    </p:ext>
+  </p:extLst>
 </p:presentation>
 </file>
 
@@ -157,10 +173,9 @@
           <a:lstStyle/>
           <a:p>
             <a:r>
-              <a:rPr lang="en-US" smtClean="0"/>
+              <a:rPr lang="en-US"/>
               <a:t>Click to edit Master title style</a:t>
             </a:r>
-            <a:endParaRPr lang="en-US"/>
           </a:p>
         </p:txBody>
       </p:sp>
@@ -276,10 +291,9 @@
           </a:lstStyle>
           <a:p>
             <a:r>
-              <a:rPr lang="en-US" smtClean="0"/>
+              <a:rPr lang="en-US"/>
               <a:t>Click to edit Master subtitle style</a:t>
             </a:r>
-            <a:endParaRPr lang="en-US"/>
           </a:p>
         </p:txBody>
       </p:sp>
@@ -300,7 +314,7 @@
           <a:p>
             <a:fld id="{5BCAD085-E8A6-8845-BD4E-CB4CCA059FC4}" type="datetimeFigureOut">
               <a:rPr lang="en-US" smtClean="0"/>
-              <a:t>1/27/13</a:t>
+              <a:t>1/27/26</a:t>
             </a:fld>
             <a:endParaRPr lang="en-US"/>
           </a:p>
@@ -394,10 +408,9 @@
           <a:lstStyle/>
           <a:p>
             <a:r>
-              <a:rPr lang="en-US" smtClean="0"/>
+              <a:rPr lang="en-US"/>
               <a:t>Click to edit Master title style</a:t>
             </a:r>
-            <a:endParaRPr lang="en-US"/>
           </a:p>
         </p:txBody>
       </p:sp>
@@ -418,38 +431,37 @@
           <a:p>
             <a:pPr lvl="0"/>
             <a:r>
-              <a:rPr lang="en-US" smtClean="0"/>
+              <a:rPr lang="en-US"/>
               <a:t>Click to edit Master text styles</a:t>
             </a:r>
           </a:p>
           <a:p>
             <a:pPr lvl="1"/>
             <a:r>
-              <a:rPr lang="en-US" smtClean="0"/>
+              <a:rPr lang="en-US"/>
               <a:t>Second level</a:t>
             </a:r>
           </a:p>
           <a:p>
             <a:pPr lvl="2"/>
             <a:r>
-              <a:rPr lang="en-US" smtClean="0"/>
+              <a:rPr lang="en-US"/>
               <a:t>Third level</a:t>
             </a:r>
           </a:p>
           <a:p>
             <a:pPr lvl="3"/>
             <a:r>
-              <a:rPr lang="en-US" smtClean="0"/>
+              <a:rPr lang="en-US"/>
               <a:t>Fourth level</a:t>
             </a:r>
           </a:p>
           <a:p>
             <a:pPr lvl="4"/>
             <a:r>
-              <a:rPr lang="en-US" smtClean="0"/>
+              <a:rPr lang="en-US"/>
               <a:t>Fifth level</a:t>
             </a:r>
-            <a:endParaRPr lang="en-US"/>
           </a:p>
         </p:txBody>
       </p:sp>
@@ -470,7 +482,7 @@
           <a:p>
             <a:fld id="{5BCAD085-E8A6-8845-BD4E-CB4CCA059FC4}" type="datetimeFigureOut">
               <a:rPr lang="en-US" smtClean="0"/>
-              <a:t>1/27/13</a:t>
+              <a:t>1/27/26</a:t>
             </a:fld>
             <a:endParaRPr lang="en-US"/>
           </a:p>
@@ -569,10 +581,9 @@
           <a:lstStyle/>
           <a:p>
             <a:r>
-              <a:rPr lang="en-US" smtClean="0"/>
+              <a:rPr lang="en-US"/>
               <a:t>Click to edit Master title style</a:t>
             </a:r>
-            <a:endParaRPr lang="en-US"/>
           </a:p>
         </p:txBody>
       </p:sp>
@@ -598,38 +609,37 @@
           <a:p>
             <a:pPr lvl="0"/>
             <a:r>
-              <a:rPr lang="en-US" smtClean="0"/>
+              <a:rPr lang="en-US"/>
               <a:t>Click to edit Master text styles</a:t>
             </a:r>
           </a:p>
           <a:p>
             <a:pPr lvl="1"/>
             <a:r>
-              <a:rPr lang="en-US" smtClean="0"/>
+              <a:rPr lang="en-US"/>
               <a:t>Second level</a:t>
             </a:r>
           </a:p>
           <a:p>
             <a:pPr lvl="2"/>
             <a:r>
-              <a:rPr lang="en-US" smtClean="0"/>
+              <a:rPr lang="en-US"/>
               <a:t>Third level</a:t>
             </a:r>
           </a:p>
           <a:p>
             <a:pPr lvl="3"/>
             <a:r>
-              <a:rPr lang="en-US" smtClean="0"/>
+              <a:rPr lang="en-US"/>
               <a:t>Fourth level</a:t>
             </a:r>
           </a:p>
           <a:p>
             <a:pPr lvl="4"/>
             <a:r>
-              <a:rPr lang="en-US" smtClean="0"/>
+              <a:rPr lang="en-US"/>
               <a:t>Fifth level</a:t>
             </a:r>
-            <a:endParaRPr lang="en-US"/>
           </a:p>
         </p:txBody>
       </p:sp>
@@ -650,7 +660,7 @@
           <a:p>
             <a:fld id="{5BCAD085-E8A6-8845-BD4E-CB4CCA059FC4}" type="datetimeFigureOut">
               <a:rPr lang="en-US" smtClean="0"/>
-              <a:t>1/27/13</a:t>
+              <a:t>1/27/26</a:t>
             </a:fld>
             <a:endParaRPr lang="en-US"/>
           </a:p>
@@ -744,10 +754,9 @@
           <a:lstStyle/>
           <a:p>
             <a:r>
-              <a:rPr lang="en-US" smtClean="0"/>
+              <a:rPr lang="en-US"/>
               <a:t>Click to edit Master title style</a:t>
             </a:r>
-            <a:endParaRPr lang="en-US"/>
           </a:p>
         </p:txBody>
       </p:sp>
@@ -768,38 +777,37 @@
           <a:p>
             <a:pPr lvl="0"/>
             <a:r>
-              <a:rPr lang="en-US" smtClean="0"/>
+              <a:rPr lang="en-US"/>
               <a:t>Click to edit Master text styles</a:t>
             </a:r>
           </a:p>
           <a:p>
             <a:pPr lvl="1"/>
             <a:r>
-              <a:rPr lang="en-US" smtClean="0"/>
+              <a:rPr lang="en-US"/>
               <a:t>Second level</a:t>
             </a:r>
           </a:p>
           <a:p>
             <a:pPr lvl="2"/>
             <a:r>
-              <a:rPr lang="en-US" smtClean="0"/>
+              <a:rPr lang="en-US"/>
               <a:t>Third level</a:t>
             </a:r>
           </a:p>
           <a:p>
             <a:pPr lvl="3"/>
             <a:r>
-              <a:rPr lang="en-US" smtClean="0"/>
+              <a:rPr lang="en-US"/>
               <a:t>Fourth level</a:t>
             </a:r>
           </a:p>
           <a:p>
             <a:pPr lvl="4"/>
             <a:r>
-              <a:rPr lang="en-US" smtClean="0"/>
+              <a:rPr lang="en-US"/>
               <a:t>Fifth level</a:t>
             </a:r>
-            <a:endParaRPr lang="en-US"/>
           </a:p>
         </p:txBody>
       </p:sp>
@@ -820,7 +828,7 @@
           <a:p>
             <a:fld id="{5BCAD085-E8A6-8845-BD4E-CB4CCA059FC4}" type="datetimeFigureOut">
               <a:rPr lang="en-US" smtClean="0"/>
-              <a:t>1/27/13</a:t>
+              <a:t>1/27/26</a:t>
             </a:fld>
             <a:endParaRPr lang="en-US"/>
           </a:p>
@@ -923,10 +931,9 @@
           </a:lstStyle>
           <a:p>
             <a:r>
-              <a:rPr lang="en-US" smtClean="0"/>
+              <a:rPr lang="en-US"/>
               <a:t>Click to edit Master title style</a:t>
             </a:r>
-            <a:endParaRPr lang="en-US"/>
           </a:p>
         </p:txBody>
       </p:sp>
@@ -1043,7 +1050,7 @@
           <a:p>
             <a:pPr lvl="0"/>
             <a:r>
-              <a:rPr lang="en-US" smtClean="0"/>
+              <a:rPr lang="en-US"/>
               <a:t>Click to edit Master text styles</a:t>
             </a:r>
           </a:p>
@@ -1066,7 +1073,7 @@
           <a:p>
             <a:fld id="{5BCAD085-E8A6-8845-BD4E-CB4CCA059FC4}" type="datetimeFigureOut">
               <a:rPr lang="en-US" smtClean="0"/>
-              <a:t>1/27/13</a:t>
+              <a:t>1/27/26</a:t>
             </a:fld>
             <a:endParaRPr lang="en-US"/>
           </a:p>
@@ -1160,10 +1167,9 @@
           <a:lstStyle/>
           <a:p>
             <a:r>
-              <a:rPr lang="en-US" smtClean="0"/>
+              <a:rPr lang="en-US"/>
               <a:t>Click to edit Master title style</a:t>
             </a:r>
-            <a:endParaRPr lang="en-US"/>
           </a:p>
         </p:txBody>
       </p:sp>
@@ -1217,38 +1223,37 @@
           <a:p>
             <a:pPr lvl="0"/>
             <a:r>
-              <a:rPr lang="en-US" smtClean="0"/>
+              <a:rPr lang="en-US"/>
               <a:t>Click to edit Master text styles</a:t>
             </a:r>
           </a:p>
           <a:p>
             <a:pPr lvl="1"/>
             <a:r>
-              <a:rPr lang="en-US" smtClean="0"/>
+              <a:rPr lang="en-US"/>
               <a:t>Second level</a:t>
             </a:r>
           </a:p>
           <a:p>
             <a:pPr lvl="2"/>
             <a:r>
-              <a:rPr lang="en-US" smtClean="0"/>
+              <a:rPr lang="en-US"/>
               <a:t>Third level</a:t>
             </a:r>
           </a:p>
           <a:p>
             <a:pPr lvl="3"/>
             <a:r>
-              <a:rPr lang="en-US" smtClean="0"/>
+              <a:rPr lang="en-US"/>
               <a:t>Fourth level</a:t>
             </a:r>
           </a:p>
           <a:p>
             <a:pPr lvl="4"/>
             <a:r>
-              <a:rPr lang="en-US" smtClean="0"/>
+              <a:rPr lang="en-US"/>
               <a:t>Fifth level</a:t>
             </a:r>
-            <a:endParaRPr lang="en-US"/>
           </a:p>
         </p:txBody>
       </p:sp>
@@ -1302,38 +1307,37 @@
           <a:p>
             <a:pPr lvl="0"/>
             <a:r>
-              <a:rPr lang="en-US" smtClean="0"/>
+              <a:rPr lang="en-US"/>
               <a:t>Click to edit Master text styles</a:t>
             </a:r>
           </a:p>
           <a:p>
             <a:pPr lvl="1"/>
             <a:r>
-              <a:rPr lang="en-US" smtClean="0"/>
+              <a:rPr lang="en-US"/>
               <a:t>Second level</a:t>
             </a:r>
           </a:p>
           <a:p>
             <a:pPr lvl="2"/>
             <a:r>
-              <a:rPr lang="en-US" smtClean="0"/>
+              <a:rPr lang="en-US"/>
               <a:t>Third level</a:t>
             </a:r>
           </a:p>
           <a:p>
             <a:pPr lvl="3"/>
             <a:r>
-              <a:rPr lang="en-US" smtClean="0"/>
+              <a:rPr lang="en-US"/>
               <a:t>Fourth level</a:t>
             </a:r>
           </a:p>
           <a:p>
             <a:pPr lvl="4"/>
             <a:r>
-              <a:rPr lang="en-US" smtClean="0"/>
+              <a:rPr lang="en-US"/>
               <a:t>Fifth level</a:t>
             </a:r>
-            <a:endParaRPr lang="en-US"/>
           </a:p>
         </p:txBody>
       </p:sp>
@@ -1354,7 +1358,7 @@
           <a:p>
             <a:fld id="{5BCAD085-E8A6-8845-BD4E-CB4CCA059FC4}" type="datetimeFigureOut">
               <a:rPr lang="en-US" smtClean="0"/>
-              <a:t>1/27/13</a:t>
+              <a:t>1/27/26</a:t>
             </a:fld>
             <a:endParaRPr lang="en-US"/>
           </a:p>
@@ -1452,10 +1456,9 @@
           </a:lstStyle>
           <a:p>
             <a:r>
-              <a:rPr lang="en-US" smtClean="0"/>
+              <a:rPr lang="en-US"/>
               <a:t>Click to edit Master title style</a:t>
             </a:r>
-            <a:endParaRPr lang="en-US"/>
           </a:p>
         </p:txBody>
       </p:sp>
@@ -1518,7 +1521,7 @@
           <a:p>
             <a:pPr lvl="0"/>
             <a:r>
-              <a:rPr lang="en-US" smtClean="0"/>
+              <a:rPr lang="en-US"/>
               <a:t>Click to edit Master text styles</a:t>
             </a:r>
           </a:p>
@@ -1574,38 +1577,37 @@
           <a:p>
             <a:pPr lvl="0"/>
             <a:r>
-              <a:rPr lang="en-US" smtClean="0"/>
+              <a:rPr lang="en-US"/>
               <a:t>Click to edit Master text styles</a:t>
             </a:r>
           </a:p>
           <a:p>
             <a:pPr lvl="1"/>
             <a:r>
-              <a:rPr lang="en-US" smtClean="0"/>
+              <a:rPr lang="en-US"/>
               <a:t>Second level</a:t>
             </a:r>
           </a:p>
           <a:p>
             <a:pPr lvl="2"/>
             <a:r>
-              <a:rPr lang="en-US" smtClean="0"/>
+              <a:rPr lang="en-US"/>
               <a:t>Third level</a:t>
             </a:r>
           </a:p>
           <a:p>
             <a:pPr lvl="3"/>
             <a:r>
-              <a:rPr lang="en-US" smtClean="0"/>
+              <a:rPr lang="en-US"/>
               <a:t>Fourth level</a:t>
             </a:r>
           </a:p>
           <a:p>
             <a:pPr lvl="4"/>
             <a:r>
-              <a:rPr lang="en-US" smtClean="0"/>
+              <a:rPr lang="en-US"/>
               <a:t>Fifth level</a:t>
             </a:r>
-            <a:endParaRPr lang="en-US"/>
           </a:p>
         </p:txBody>
       </p:sp>
@@ -1668,7 +1670,7 @@
           <a:p>
             <a:pPr lvl="0"/>
             <a:r>
-              <a:rPr lang="en-US" smtClean="0"/>
+              <a:rPr lang="en-US"/>
               <a:t>Click to edit Master text styles</a:t>
             </a:r>
           </a:p>
@@ -1724,38 +1726,37 @@
           <a:p>
             <a:pPr lvl="0"/>
             <a:r>
-              <a:rPr lang="en-US" smtClean="0"/>
+              <a:rPr lang="en-US"/>
               <a:t>Click to edit Master text styles</a:t>
             </a:r>
           </a:p>
           <a:p>
             <a:pPr lvl="1"/>
             <a:r>
-              <a:rPr lang="en-US" smtClean="0"/>
+              <a:rPr lang="en-US"/>
               <a:t>Second level</a:t>
             </a:r>
           </a:p>
           <a:p>
             <a:pPr lvl="2"/>
             <a:r>
-              <a:rPr lang="en-US" smtClean="0"/>
+              <a:rPr lang="en-US"/>
               <a:t>Third level</a:t>
             </a:r>
           </a:p>
           <a:p>
             <a:pPr lvl="3"/>
             <a:r>
-              <a:rPr lang="en-US" smtClean="0"/>
+              <a:rPr lang="en-US"/>
               <a:t>Fourth level</a:t>
             </a:r>
           </a:p>
           <a:p>
             <a:pPr lvl="4"/>
             <a:r>
-              <a:rPr lang="en-US" smtClean="0"/>
+              <a:rPr lang="en-US"/>
               <a:t>Fifth level</a:t>
             </a:r>
-            <a:endParaRPr lang="en-US"/>
           </a:p>
         </p:txBody>
       </p:sp>
@@ -1776,7 +1777,7 @@
           <a:p>
             <a:fld id="{5BCAD085-E8A6-8845-BD4E-CB4CCA059FC4}" type="datetimeFigureOut">
               <a:rPr lang="en-US" smtClean="0"/>
-              <a:t>1/27/13</a:t>
+              <a:t>1/27/26</a:t>
             </a:fld>
             <a:endParaRPr lang="en-US"/>
           </a:p>
@@ -1870,10 +1871,9 @@
           <a:lstStyle/>
           <a:p>
             <a:r>
-              <a:rPr lang="en-US" smtClean="0"/>
+              <a:rPr lang="en-US"/>
               <a:t>Click to edit Master title style</a:t>
             </a:r>
-            <a:endParaRPr lang="en-US"/>
           </a:p>
         </p:txBody>
       </p:sp>
@@ -1894,7 +1894,7 @@
           <a:p>
             <a:fld id="{5BCAD085-E8A6-8845-BD4E-CB4CCA059FC4}" type="datetimeFigureOut">
               <a:rPr lang="en-US" smtClean="0"/>
-              <a:t>1/27/13</a:t>
+              <a:t>1/27/26</a:t>
             </a:fld>
             <a:endParaRPr lang="en-US"/>
           </a:p>
@@ -1989,7 +1989,7 @@
           <a:p>
             <a:fld id="{5BCAD085-E8A6-8845-BD4E-CB4CCA059FC4}" type="datetimeFigureOut">
               <a:rPr lang="en-US" smtClean="0"/>
-              <a:t>1/27/13</a:t>
+              <a:t>1/27/26</a:t>
             </a:fld>
             <a:endParaRPr lang="en-US"/>
           </a:p>
@@ -2092,10 +2092,9 @@
           </a:lstStyle>
           <a:p>
             <a:r>
-              <a:rPr lang="en-US" smtClean="0"/>
+              <a:rPr lang="en-US"/>
               <a:t>Click to edit Master title style</a:t>
             </a:r>
-            <a:endParaRPr lang="en-US"/>
           </a:p>
         </p:txBody>
       </p:sp>
@@ -2149,38 +2148,37 @@
           <a:p>
             <a:pPr lvl="0"/>
             <a:r>
-              <a:rPr lang="en-US" smtClean="0"/>
+              <a:rPr lang="en-US"/>
               <a:t>Click to edit Master text styles</a:t>
             </a:r>
           </a:p>
           <a:p>
             <a:pPr lvl="1"/>
             <a:r>
-              <a:rPr lang="en-US" smtClean="0"/>
+              <a:rPr lang="en-US"/>
               <a:t>Second level</a:t>
             </a:r>
           </a:p>
           <a:p>
             <a:pPr lvl="2"/>
             <a:r>
-              <a:rPr lang="en-US" smtClean="0"/>
+              <a:rPr lang="en-US"/>
               <a:t>Third level</a:t>
             </a:r>
           </a:p>
           <a:p>
             <a:pPr lvl="3"/>
             <a:r>
-              <a:rPr lang="en-US" smtClean="0"/>
+              <a:rPr lang="en-US"/>
               <a:t>Fourth level</a:t>
             </a:r>
           </a:p>
           <a:p>
             <a:pPr lvl="4"/>
             <a:r>
-              <a:rPr lang="en-US" smtClean="0"/>
+              <a:rPr lang="en-US"/>
               <a:t>Fifth level</a:t>
             </a:r>
-            <a:endParaRPr lang="en-US"/>
           </a:p>
         </p:txBody>
       </p:sp>
@@ -2243,7 +2241,7 @@
           <a:p>
             <a:pPr lvl="0"/>
             <a:r>
-              <a:rPr lang="en-US" smtClean="0"/>
+              <a:rPr lang="en-US"/>
               <a:t>Click to edit Master text styles</a:t>
             </a:r>
           </a:p>
@@ -2266,7 +2264,7 @@
           <a:p>
             <a:fld id="{5BCAD085-E8A6-8845-BD4E-CB4CCA059FC4}" type="datetimeFigureOut">
               <a:rPr lang="en-US" smtClean="0"/>
-              <a:t>1/27/13</a:t>
+              <a:t>1/27/26</a:t>
             </a:fld>
             <a:endParaRPr lang="en-US"/>
           </a:p>
@@ -2369,10 +2367,9 @@
           </a:lstStyle>
           <a:p>
             <a:r>
-              <a:rPr lang="en-US" smtClean="0"/>
+              <a:rPr lang="en-US"/>
               <a:t>Click to edit Master title style</a:t>
             </a:r>
-            <a:endParaRPr lang="en-US"/>
           </a:p>
         </p:txBody>
       </p:sp>
@@ -2496,7 +2493,7 @@
           <a:p>
             <a:pPr lvl="0"/>
             <a:r>
-              <a:rPr lang="en-US" smtClean="0"/>
+              <a:rPr lang="en-US"/>
               <a:t>Click to edit Master text styles</a:t>
             </a:r>
           </a:p>
@@ -2519,7 +2516,7 @@
           <a:p>
             <a:fld id="{5BCAD085-E8A6-8845-BD4E-CB4CCA059FC4}" type="datetimeFigureOut">
               <a:rPr lang="en-US" smtClean="0"/>
-              <a:t>1/27/13</a:t>
+              <a:t>1/27/26</a:t>
             </a:fld>
             <a:endParaRPr lang="en-US"/>
           </a:p>
@@ -2628,10 +2625,9 @@
           <a:lstStyle/>
           <a:p>
             <a:r>
-              <a:rPr lang="en-US" smtClean="0"/>
+              <a:rPr lang="en-US"/>
               <a:t>Click to edit Master title style</a:t>
             </a:r>
-            <a:endParaRPr lang="en-US"/>
           </a:p>
         </p:txBody>
       </p:sp>
@@ -2662,38 +2658,37 @@
           <a:p>
             <a:pPr lvl="0"/>
             <a:r>
-              <a:rPr lang="en-US" smtClean="0"/>
+              <a:rPr lang="en-US"/>
               <a:t>Click to edit Master text styles</a:t>
             </a:r>
           </a:p>
           <a:p>
             <a:pPr lvl="1"/>
             <a:r>
-              <a:rPr lang="en-US" smtClean="0"/>
+              <a:rPr lang="en-US"/>
               <a:t>Second level</a:t>
             </a:r>
           </a:p>
           <a:p>
             <a:pPr lvl="2"/>
             <a:r>
-              <a:rPr lang="en-US" smtClean="0"/>
+              <a:rPr lang="en-US"/>
               <a:t>Third level</a:t>
             </a:r>
           </a:p>
           <a:p>
             <a:pPr lvl="3"/>
             <a:r>
-              <a:rPr lang="en-US" smtClean="0"/>
+              <a:rPr lang="en-US"/>
               <a:t>Fourth level</a:t>
             </a:r>
           </a:p>
           <a:p>
             <a:pPr lvl="4"/>
             <a:r>
-              <a:rPr lang="en-US" smtClean="0"/>
+              <a:rPr lang="en-US"/>
               <a:t>Fifth level</a:t>
             </a:r>
-            <a:endParaRPr lang="en-US"/>
           </a:p>
         </p:txBody>
       </p:sp>
@@ -2732,7 +2727,7 @@
           <a:p>
             <a:fld id="{5BCAD085-E8A6-8845-BD4E-CB4CCA059FC4}" type="datetimeFigureOut">
               <a:rPr lang="en-US" smtClean="0"/>
-              <a:t>1/27/13</a:t>
+              <a:t>1/27/26</a:t>
             </a:fld>
             <a:endParaRPr lang="en-US"/>
           </a:p>
@@ -3091,7 +3086,7 @@
 </file>
 
 <file path=ppt/slides/slide1.xml><?xml version="1.0" encoding="utf-8"?>
-<p:sld xmlns:a="http://schemas.openxmlformats.org/drawingml/2006/main" xmlns:p="http://schemas.openxmlformats.org/presentationml/2006/main" xmlns:r="http://schemas.openxmlformats.org/officeDocument/2006/relationships">
+<p:sld xmlns:a="http://schemas.openxmlformats.org/drawingml/2006/main" xmlns:r="http://schemas.openxmlformats.org/officeDocument/2006/relationships" xmlns:p="http://schemas.openxmlformats.org/presentationml/2006/main">
   <p:cSld>
     <p:spTree>
       <p:nvGrpSpPr>
@@ -3099,7 +3094,14 @@
         <p:cNvGrpSpPr/>
         <p:nvPr/>
       </p:nvGrpSpPr>
-      <p:grpSpPr/>
+      <p:grpSpPr>
+        <a:xfrm>
+          <a:off x="0" y="0"/>
+          <a:ext cx="0" cy="0"/>
+          <a:chOff x="0" y="0"/>
+          <a:chExt cx="0" cy="0"/>
+        </a:xfrm>
+      </p:grpSpPr>
       <p:sp>
         <p:nvSpPr>
           <p:cNvPr id="2" name="Title 1"/>
@@ -3156,7 +3158,7 @@
 </file>
 
 <file path=ppt/slides/slide10.xml><?xml version="1.0" encoding="utf-8"?>
-<p:sld xmlns:a="http://schemas.openxmlformats.org/drawingml/2006/main" xmlns:p="http://schemas.openxmlformats.org/presentationml/2006/main" xmlns:r="http://schemas.openxmlformats.org/officeDocument/2006/relationships">
+<p:sld xmlns:a="http://schemas.openxmlformats.org/drawingml/2006/main" xmlns:r="http://schemas.openxmlformats.org/officeDocument/2006/relationships" xmlns:p="http://schemas.openxmlformats.org/presentationml/2006/main">
   <p:cSld>
     <p:spTree>
       <p:nvGrpSpPr>
@@ -3164,7 +3166,14 @@
         <p:cNvGrpSpPr/>
         <p:nvPr/>
       </p:nvGrpSpPr>
-      <p:grpSpPr/>
+      <p:grpSpPr>
+        <a:xfrm>
+          <a:off x="0" y="0"/>
+          <a:ext cx="0" cy="0"/>
+          <a:chOff x="0" y="0"/>
+          <a:chExt cx="0" cy="0"/>
+        </a:xfrm>
+      </p:grpSpPr>
       <p:sp>
         <p:nvSpPr>
           <p:cNvPr id="2" name="TextBox 1"/>
@@ -3229,7 +3238,7 @@
 </file>
 
 <file path=ppt/slides/slide11.xml><?xml version="1.0" encoding="utf-8"?>
-<p:sld xmlns:a="http://schemas.openxmlformats.org/drawingml/2006/main" xmlns:p="http://schemas.openxmlformats.org/presentationml/2006/main" xmlns:r="http://schemas.openxmlformats.org/officeDocument/2006/relationships">
+<p:sld xmlns:a="http://schemas.openxmlformats.org/drawingml/2006/main" xmlns:r="http://schemas.openxmlformats.org/officeDocument/2006/relationships" xmlns:p="http://schemas.openxmlformats.org/presentationml/2006/main">
   <p:cSld>
     <p:spTree>
       <p:nvGrpSpPr>
@@ -3237,7 +3246,14 @@
         <p:cNvGrpSpPr/>
         <p:nvPr/>
       </p:nvGrpSpPr>
-      <p:grpSpPr/>
+      <p:grpSpPr>
+        <a:xfrm>
+          <a:off x="0" y="0"/>
+          <a:ext cx="0" cy="0"/>
+          <a:chOff x="0" y="0"/>
+          <a:chExt cx="0" cy="0"/>
+        </a:xfrm>
+      </p:grpSpPr>
       <p:sp>
         <p:nvSpPr>
           <p:cNvPr id="2" name="Title 1"/>
@@ -3274,25 +3290,21 @@
           <a:bodyPr/>
           <a:lstStyle/>
           <a:p>
-            <a:pPr/>
             <a:r>
               <a:t>Frontend: Next.js admin UI</a:t>
             </a:r>
           </a:p>
           <a:p>
-            <a:pPr/>
             <a:r>
               <a:t>Backend: FastAPI API + auth</a:t>
             </a:r>
           </a:p>
           <a:p>
-            <a:pPr/>
             <a:r>
               <a:t>Pipeline: worker jobs (transcription, extraction, contract generation)</a:t>
             </a:r>
           </a:p>
           <a:p>
-            <a:pPr/>
             <a:r>
               <a:t>Storage: Postgres (entities) + S3/MinIO (audio)</a:t>
             </a:r>
@@ -3308,7 +3320,7 @@
 </file>
 
 <file path=ppt/slides/slide12.xml><?xml version="1.0" encoding="utf-8"?>
-<p:sld xmlns:a="http://schemas.openxmlformats.org/drawingml/2006/main" xmlns:p="http://schemas.openxmlformats.org/presentationml/2006/main" xmlns:r="http://schemas.openxmlformats.org/officeDocument/2006/relationships">
+<p:sld xmlns:a="http://schemas.openxmlformats.org/drawingml/2006/main" xmlns:r="http://schemas.openxmlformats.org/officeDocument/2006/relationships" xmlns:p="http://schemas.openxmlformats.org/presentationml/2006/main">
   <p:cSld>
     <p:spTree>
       <p:nvGrpSpPr>
@@ -3316,7 +3328,14 @@
         <p:cNvGrpSpPr/>
         <p:nvPr/>
       </p:nvGrpSpPr>
-      <p:grpSpPr/>
+      <p:grpSpPr>
+        <a:xfrm>
+          <a:off x="0" y="0"/>
+          <a:ext cx="0" cy="0"/>
+          <a:chOff x="0" y="0"/>
+          <a:chExt cx="0" cy="0"/>
+        </a:xfrm>
+      </p:grpSpPr>
       <p:sp>
         <p:nvSpPr>
           <p:cNvPr id="2" name="Title 1"/>
@@ -3353,19 +3372,16 @@
           <a:bodyPr/>
           <a:lstStyle/>
           <a:p>
-            <a:pPr/>
             <a:r>
               <a:t>Subscription per agency / location</a:t>
             </a:r>
           </a:p>
           <a:p>
-            <a:pPr/>
             <a:r>
               <a:t>Tiered plans by usage (visits/month, storage, seats)</a:t>
             </a:r>
           </a:p>
           <a:p>
-            <a:pPr/>
             <a:r>
               <a:t>Optional onboarding + integrations</a:t>
             </a:r>
@@ -3381,7 +3397,7 @@
 </file>
 
 <file path=ppt/slides/slide13.xml><?xml version="1.0" encoding="utf-8"?>
-<p:sld xmlns:a="http://schemas.openxmlformats.org/drawingml/2006/main" xmlns:p="http://schemas.openxmlformats.org/presentationml/2006/main" xmlns:r="http://schemas.openxmlformats.org/officeDocument/2006/relationships">
+<p:sld xmlns:a="http://schemas.openxmlformats.org/drawingml/2006/main" xmlns:r="http://schemas.openxmlformats.org/officeDocument/2006/relationships" xmlns:p="http://schemas.openxmlformats.org/presentationml/2006/main">
   <p:cSld>
     <p:spTree>
       <p:nvGrpSpPr>
@@ -3389,7 +3405,14 @@
         <p:cNvGrpSpPr/>
         <p:nvPr/>
       </p:nvGrpSpPr>
-      <p:grpSpPr/>
+      <p:grpSpPr>
+        <a:xfrm>
+          <a:off x="0" y="0"/>
+          <a:ext cx="0" cy="0"/>
+          <a:chOff x="0" y="0"/>
+          <a:chExt cx="0" cy="0"/>
+        </a:xfrm>
+      </p:grpSpPr>
       <p:sp>
         <p:nvSpPr>
           <p:cNvPr id="2" name="Title 1"/>
@@ -3426,25 +3449,21 @@
           <a:bodyPr/>
           <a:lstStyle/>
           <a:p>
-            <a:pPr/>
             <a:r>
               <a:t>Deeper template controls + clause library</a:t>
             </a:r>
           </a:p>
           <a:p>
-            <a:pPr/>
             <a:r>
               <a:t>More robust validation + audit trails</a:t>
             </a:r>
           </a:p>
           <a:p>
-            <a:pPr/>
             <a:r>
               <a:t>Integrations (EMR/CRM, billing systems)</a:t>
             </a:r>
           </a:p>
           <a:p>
-            <a:pPr/>
             <a:r>
               <a:t>Multi-location analytics and admin tooling</a:t>
             </a:r>
@@ -3460,7 +3479,7 @@
 </file>
 
 <file path=ppt/slides/slide2.xml><?xml version="1.0" encoding="utf-8"?>
-<p:sld xmlns:a="http://schemas.openxmlformats.org/drawingml/2006/main" xmlns:p="http://schemas.openxmlformats.org/presentationml/2006/main" xmlns:r="http://schemas.openxmlformats.org/officeDocument/2006/relationships">
+<p:sld xmlns:a="http://schemas.openxmlformats.org/drawingml/2006/main" xmlns:r="http://schemas.openxmlformats.org/officeDocument/2006/relationships" xmlns:p="http://schemas.openxmlformats.org/presentationml/2006/main">
   <p:cSld>
     <p:spTree>
       <p:nvGrpSpPr>
@@ -3468,7 +3487,14 @@
         <p:cNvGrpSpPr/>
         <p:nvPr/>
       </p:nvGrpSpPr>
-      <p:grpSpPr/>
+      <p:grpSpPr>
+        <a:xfrm>
+          <a:off x="0" y="0"/>
+          <a:ext cx="0" cy="0"/>
+          <a:chOff x="0" y="0"/>
+          <a:chExt cx="0" cy="0"/>
+        </a:xfrm>
+      </p:grpSpPr>
       <p:sp>
         <p:nvSpPr>
           <p:cNvPr id="2" name="Title 1"/>
@@ -3505,19 +3531,16 @@
           <a:bodyPr/>
           <a:lstStyle/>
           <a:p>
-            <a:pPr/>
             <a:r>
               <a:t>Slow: intake calls → manual notes → manual pricing → manual contract drafting</a:t>
             </a:r>
           </a:p>
           <a:p>
-            <a:pPr/>
             <a:r>
               <a:t>Inconsistent: variability across coordinators/branches leads to pricing and scope errors</a:t>
             </a:r>
           </a:p>
           <a:p>
-            <a:pPr/>
             <a:r>
               <a:t>High-stakes: delays and mistakes cost revenue, compliance risk, and client trust</a:t>
             </a:r>
@@ -3533,7 +3556,7 @@
 </file>
 
 <file path=ppt/slides/slide3.xml><?xml version="1.0" encoding="utf-8"?>
-<p:sld xmlns:a="http://schemas.openxmlformats.org/drawingml/2006/main" xmlns:p="http://schemas.openxmlformats.org/presentationml/2006/main" xmlns:r="http://schemas.openxmlformats.org/officeDocument/2006/relationships">
+<p:sld xmlns:a="http://schemas.openxmlformats.org/drawingml/2006/main" xmlns:r="http://schemas.openxmlformats.org/officeDocument/2006/relationships" xmlns:p="http://schemas.openxmlformats.org/presentationml/2006/main">
   <p:cSld>
     <p:spTree>
       <p:nvGrpSpPr>
@@ -3541,7 +3564,14 @@
         <p:cNvGrpSpPr/>
         <p:nvPr/>
       </p:nvGrpSpPr>
-      <p:grpSpPr/>
+      <p:grpSpPr>
+        <a:xfrm>
+          <a:off x="0" y="0"/>
+          <a:ext cx="0" cy="0"/>
+          <a:chOff x="0" y="0"/>
+          <a:chExt cx="0" cy="0"/>
+        </a:xfrm>
+      </p:grpSpPr>
       <p:sp>
         <p:nvSpPr>
           <p:cNvPr id="2" name="Title 1"/>
@@ -3578,25 +3608,21 @@
           <a:bodyPr/>
           <a:lstStyle/>
           <a:p>
-            <a:pPr/>
             <a:r>
               <a:t>Transcript ingestion (upload audio or import text)</a:t>
             </a:r>
           </a:p>
           <a:p>
-            <a:pPr/>
             <a:r>
               <a:t>Services &amp; billables extraction</a:t>
             </a:r>
           </a:p>
           <a:p>
-            <a:pPr/>
             <a:r>
               <a:t>Contract drafting from templates</a:t>
             </a:r>
           </a:p>
           <a:p>
-            <a:pPr/>
             <a:r>
               <a:t>Review + edit + export (PDF/CSV) in one place</a:t>
             </a:r>
@@ -3612,7 +3638,7 @@
 </file>
 
 <file path=ppt/slides/slide4.xml><?xml version="1.0" encoding="utf-8"?>
-<p:sld xmlns:a="http://schemas.openxmlformats.org/drawingml/2006/main" xmlns:p="http://schemas.openxmlformats.org/presentationml/2006/main" xmlns:r="http://schemas.openxmlformats.org/officeDocument/2006/relationships">
+<p:sld xmlns:a="http://schemas.openxmlformats.org/drawingml/2006/main" xmlns:r="http://schemas.openxmlformats.org/officeDocument/2006/relationships" xmlns:p="http://schemas.openxmlformats.org/presentationml/2006/main">
   <p:cSld>
     <p:spTree>
       <p:nvGrpSpPr>
@@ -3620,7 +3646,14 @@
         <p:cNvGrpSpPr/>
         <p:nvPr/>
       </p:nvGrpSpPr>
-      <p:grpSpPr/>
+      <p:grpSpPr>
+        <a:xfrm>
+          <a:off x="0" y="0"/>
+          <a:ext cx="0" cy="0"/>
+          <a:chOff x="0" y="0"/>
+          <a:chExt cx="0" cy="0"/>
+        </a:xfrm>
+      </p:grpSpPr>
       <p:sp>
         <p:nvSpPr>
           <p:cNvPr id="2" name="TextBox 1"/>
@@ -3685,7 +3718,7 @@
 </file>
 
 <file path=ppt/slides/slide5.xml><?xml version="1.0" encoding="utf-8"?>
-<p:sld xmlns:a="http://schemas.openxmlformats.org/drawingml/2006/main" xmlns:p="http://schemas.openxmlformats.org/presentationml/2006/main" xmlns:r="http://schemas.openxmlformats.org/officeDocument/2006/relationships">
+<p:sld xmlns:a="http://schemas.openxmlformats.org/drawingml/2006/main" xmlns:r="http://schemas.openxmlformats.org/officeDocument/2006/relationships" xmlns:p="http://schemas.openxmlformats.org/presentationml/2006/main">
   <p:cSld>
     <p:spTree>
       <p:nvGrpSpPr>
@@ -3693,7 +3726,14 @@
         <p:cNvGrpSpPr/>
         <p:nvPr/>
       </p:nvGrpSpPr>
-      <p:grpSpPr/>
+      <p:grpSpPr>
+        <a:xfrm>
+          <a:off x="0" y="0"/>
+          <a:ext cx="0" cy="0"/>
+          <a:chOff x="0" y="0"/>
+          <a:chExt cx="0" cy="0"/>
+        </a:xfrm>
+      </p:grpSpPr>
       <p:sp>
         <p:nvSpPr>
           <p:cNvPr id="2" name="TextBox 1"/>
@@ -3789,7 +3829,7 @@
 </file>
 
 <file path=ppt/slides/slide6.xml><?xml version="1.0" encoding="utf-8"?>
-<p:sld xmlns:a="http://schemas.openxmlformats.org/drawingml/2006/main" xmlns:p="http://schemas.openxmlformats.org/presentationml/2006/main" xmlns:r="http://schemas.openxmlformats.org/officeDocument/2006/relationships">
+<p:sld xmlns:a="http://schemas.openxmlformats.org/drawingml/2006/main" xmlns:r="http://schemas.openxmlformats.org/officeDocument/2006/relationships" xmlns:p="http://schemas.openxmlformats.org/presentationml/2006/main">
   <p:cSld>
     <p:spTree>
       <p:nvGrpSpPr>
@@ -3797,7 +3837,14 @@
         <p:cNvGrpSpPr/>
         <p:nvPr/>
       </p:nvGrpSpPr>
-      <p:grpSpPr/>
+      <p:grpSpPr>
+        <a:xfrm>
+          <a:off x="0" y="0"/>
+          <a:ext cx="0" cy="0"/>
+          <a:chOff x="0" y="0"/>
+          <a:chExt cx="0" cy="0"/>
+        </a:xfrm>
+      </p:grpSpPr>
       <p:sp>
         <p:nvSpPr>
           <p:cNvPr id="2" name="Title 1"/>
@@ -3834,25 +3881,21 @@
           <a:bodyPr/>
           <a:lstStyle/>
           <a:p>
-            <a:pPr/>
             <a:r>
               <a:t>Start or import an assessment</a:t>
             </a:r>
           </a:p>
           <a:p>
-            <a:pPr/>
             <a:r>
               <a:t>Run pipeline steps (transcribe → bill → contract)</a:t>
             </a:r>
           </a:p>
           <a:p>
-            <a:pPr/>
             <a:r>
               <a:t>Review outputs in the right-side panel</a:t>
             </a:r>
           </a:p>
           <a:p>
-            <a:pPr/>
             <a:r>
               <a:t>Export PDF/CSV for client + billing ops</a:t>
             </a:r>
@@ -3868,7 +3911,7 @@
 </file>
 
 <file path=ppt/slides/slide7.xml><?xml version="1.0" encoding="utf-8"?>
-<p:sld xmlns:a="http://schemas.openxmlformats.org/drawingml/2006/main" xmlns:p="http://schemas.openxmlformats.org/presentationml/2006/main" xmlns:r="http://schemas.openxmlformats.org/officeDocument/2006/relationships">
+<p:sld xmlns:a="http://schemas.openxmlformats.org/drawingml/2006/main" xmlns:r="http://schemas.openxmlformats.org/officeDocument/2006/relationships" xmlns:p="http://schemas.openxmlformats.org/presentationml/2006/main">
   <p:cSld>
     <p:spTree>
       <p:nvGrpSpPr>
@@ -3876,7 +3919,14 @@
         <p:cNvGrpSpPr/>
         <p:nvPr/>
       </p:nvGrpSpPr>
-      <p:grpSpPr/>
+      <p:grpSpPr>
+        <a:xfrm>
+          <a:off x="0" y="0"/>
+          <a:ext cx="0" cy="0"/>
+          <a:chOff x="0" y="0"/>
+          <a:chExt cx="0" cy="0"/>
+        </a:xfrm>
+      </p:grpSpPr>
       <p:sp>
         <p:nvSpPr>
           <p:cNvPr id="2" name="TextBox 1"/>
@@ -3924,7 +3974,7 @@
         </p:blipFill>
         <p:spPr>
           <a:xfrm>
-            <a:off x="2824784" y="1051560"/>
+            <a:off x="2998956" y="960120"/>
             <a:ext cx="6542126" cy="5394960"/>
           </a:xfrm>
           <a:prstGeom prst="rect">
@@ -3941,7 +3991,7 @@
 </file>
 
 <file path=ppt/slides/slide8.xml><?xml version="1.0" encoding="utf-8"?>
-<p:sld xmlns:a="http://schemas.openxmlformats.org/drawingml/2006/main" xmlns:p="http://schemas.openxmlformats.org/presentationml/2006/main" xmlns:r="http://schemas.openxmlformats.org/officeDocument/2006/relationships">
+<p:sld xmlns:a="http://schemas.openxmlformats.org/drawingml/2006/main" xmlns:r="http://schemas.openxmlformats.org/officeDocument/2006/relationships" xmlns:p="http://schemas.openxmlformats.org/presentationml/2006/main">
   <p:cSld>
     <p:spTree>
       <p:nvGrpSpPr>
@@ -3949,7 +3999,14 @@
         <p:cNvGrpSpPr/>
         <p:nvPr/>
       </p:nvGrpSpPr>
-      <p:grpSpPr/>
+      <p:grpSpPr>
+        <a:xfrm>
+          <a:off x="0" y="0"/>
+          <a:ext cx="0" cy="0"/>
+          <a:chOff x="0" y="0"/>
+          <a:chExt cx="0" cy="0"/>
+        </a:xfrm>
+      </p:grpSpPr>
       <p:sp>
         <p:nvSpPr>
           <p:cNvPr id="2" name="TextBox 1"/>
@@ -4045,7 +4102,7 @@
 </file>
 
 <file path=ppt/slides/slide9.xml><?xml version="1.0" encoding="utf-8"?>
-<p:sld xmlns:a="http://schemas.openxmlformats.org/drawingml/2006/main" xmlns:p="http://schemas.openxmlformats.org/presentationml/2006/main" xmlns:r="http://schemas.openxmlformats.org/officeDocument/2006/relationships">
+<p:sld xmlns:a="http://schemas.openxmlformats.org/drawingml/2006/main" xmlns:r="http://schemas.openxmlformats.org/officeDocument/2006/relationships" xmlns:p="http://schemas.openxmlformats.org/presentationml/2006/main">
   <p:cSld>
     <p:spTree>
       <p:nvGrpSpPr>
@@ -4053,7 +4110,14 @@
         <p:cNvGrpSpPr/>
         <p:nvPr/>
       </p:nvGrpSpPr>
-      <p:grpSpPr/>
+      <p:grpSpPr>
+        <a:xfrm>
+          <a:off x="0" y="0"/>
+          <a:ext cx="0" cy="0"/>
+          <a:chOff x="0" y="0"/>
+          <a:chExt cx="0" cy="0"/>
+        </a:xfrm>
+      </p:grpSpPr>
       <p:sp>
         <p:nvSpPr>
           <p:cNvPr id="2" name="TextBox 1"/>

</xml_diff>